<commit_message>
rectified why CLT does not apply
</commit_message>
<xml_diff>
--- a/Caroline_project_CYOH_presentation.pptx
+++ b/Caroline_project_CYOH_presentation.pptx
@@ -113,6 +113,11 @@
       </a:defRPr>
     </a:lvl9pPr>
   </p:defaultTextStyle>
+  <p:extLst>
+    <p:ext uri="{EFAFB233-063F-42B5-8137-9DF3F51BA10A}">
+      <p15:sldGuideLst xmlns:p15="http://schemas.microsoft.com/office/powerpoint/2012/main"/>
+    </p:ext>
+  </p:extLst>
 </p:presentation>
 </file>
 
@@ -198,7 +203,7 @@
           <a:p>
             <a:fld id="{087B2D18-B300-FA43-B69B-62FFA26063C8}" type="datetimeFigureOut">
               <a:rPr lang="en-US" smtClean="0"/>
-              <a:t>12/14/25</a:t>
+              <a:t>12/15/25</a:t>
             </a:fld>
             <a:endParaRPr lang="en-US"/>
           </a:p>
@@ -596,6 +601,98 @@
           <a:bodyPr/>
           <a:lstStyle/>
           <a:p>
+            <a:endParaRPr lang="en-US" sz="1200" b="0" i="0" kern="1200" dirty="0">
+              <a:solidFill>
+                <a:schemeClr val="tx1"/>
+              </a:solidFill>
+              <a:effectLst/>
+              <a:latin typeface="+mn-lt"/>
+              <a:ea typeface="+mn-ea"/>
+              <a:cs typeface="+mn-cs"/>
+            </a:endParaRPr>
+          </a:p>
+        </p:txBody>
+      </p:sp>
+      <p:sp>
+        <p:nvSpPr>
+          <p:cNvPr id="4" name="Slide Number Placeholder 3"/>
+          <p:cNvSpPr>
+            <a:spLocks noGrp="1"/>
+          </p:cNvSpPr>
+          <p:nvPr>
+            <p:ph type="sldNum" sz="quarter" idx="5"/>
+          </p:nvPr>
+        </p:nvSpPr>
+        <p:spPr/>
+        <p:txBody>
+          <a:bodyPr/>
+          <a:lstStyle/>
+          <a:p>
+            <a:fld id="{583A168D-38D9-B047-822A-F167E3340AA0}" type="slidenum">
+              <a:rPr lang="en-US" smtClean="0"/>
+              <a:t>3</a:t>
+            </a:fld>
+            <a:endParaRPr lang="en-US"/>
+          </a:p>
+        </p:txBody>
+      </p:sp>
+    </p:spTree>
+    <p:extLst>
+      <p:ext uri="{BB962C8B-B14F-4D97-AF65-F5344CB8AC3E}">
+        <p14:creationId xmlns:p14="http://schemas.microsoft.com/office/powerpoint/2010/main" val="228149956"/>
+      </p:ext>
+    </p:extLst>
+  </p:cSld>
+  <p:clrMapOvr>
+    <a:masterClrMapping/>
+  </p:clrMapOvr>
+</p:notes>
+</file>
+
+<file path=ppt/notesSlides/notesSlide3.xml><?xml version="1.0" encoding="utf-8"?>
+<p:notes xmlns:a="http://schemas.openxmlformats.org/drawingml/2006/main" xmlns:r="http://schemas.openxmlformats.org/officeDocument/2006/relationships" xmlns:p="http://schemas.openxmlformats.org/presentationml/2006/main">
+  <p:cSld>
+    <p:spTree>
+      <p:nvGrpSpPr>
+        <p:cNvPr id="1" name=""/>
+        <p:cNvGrpSpPr/>
+        <p:nvPr/>
+      </p:nvGrpSpPr>
+      <p:grpSpPr>
+        <a:xfrm>
+          <a:off x="0" y="0"/>
+          <a:ext cx="0" cy="0"/>
+          <a:chOff x="0" y="0"/>
+          <a:chExt cx="0" cy="0"/>
+        </a:xfrm>
+      </p:grpSpPr>
+      <p:sp>
+        <p:nvSpPr>
+          <p:cNvPr id="2" name="Slide Image Placeholder 1"/>
+          <p:cNvSpPr>
+            <a:spLocks noGrp="1" noRot="1" noChangeAspect="1"/>
+          </p:cNvSpPr>
+          <p:nvPr>
+            <p:ph type="sldImg"/>
+          </p:nvPr>
+        </p:nvSpPr>
+        <p:spPr/>
+      </p:sp>
+      <p:sp>
+        <p:nvSpPr>
+          <p:cNvPr id="3" name="Notes Placeholder 2"/>
+          <p:cNvSpPr>
+            <a:spLocks noGrp="1"/>
+          </p:cNvSpPr>
+          <p:nvPr>
+            <p:ph type="body" idx="1"/>
+          </p:nvPr>
+        </p:nvSpPr>
+        <p:spPr/>
+        <p:txBody>
+          <a:bodyPr/>
+          <a:lstStyle/>
+          <a:p>
             <a:endParaRPr lang="en-US" dirty="0"/>
           </a:p>
         </p:txBody>
@@ -775,7 +872,7 @@
           <a:p>
             <a:fld id="{65F7C1B1-FAD3-1847-BAA2-20EE38C9D46F}" type="datetimeFigureOut">
               <a:rPr lang="en-US" smtClean="0"/>
-              <a:t>12/14/25</a:t>
+              <a:t>12/15/25</a:t>
             </a:fld>
             <a:endParaRPr lang="en-US"/>
           </a:p>
@@ -986,7 +1083,7 @@
           <a:p>
             <a:fld id="{65F7C1B1-FAD3-1847-BAA2-20EE38C9D46F}" type="datetimeFigureOut">
               <a:rPr lang="en-US" smtClean="0"/>
-              <a:t>12/14/25</a:t>
+              <a:t>12/15/25</a:t>
             </a:fld>
             <a:endParaRPr lang="en-US"/>
           </a:p>
@@ -1201,7 +1298,7 @@
           <a:p>
             <a:fld id="{65F7C1B1-FAD3-1847-BAA2-20EE38C9D46F}" type="datetimeFigureOut">
               <a:rPr lang="en-US" smtClean="0"/>
-              <a:t>12/14/25</a:t>
+              <a:t>12/15/25</a:t>
             </a:fld>
             <a:endParaRPr lang="en-US"/>
           </a:p>
@@ -1402,7 +1499,7 @@
           <a:p>
             <a:fld id="{65F7C1B1-FAD3-1847-BAA2-20EE38C9D46F}" type="datetimeFigureOut">
               <a:rPr lang="en-US" smtClean="0"/>
-              <a:t>12/14/25</a:t>
+              <a:t>12/15/25</a:t>
             </a:fld>
             <a:endParaRPr lang="en-US"/>
           </a:p>
@@ -1681,7 +1778,7 @@
           <a:p>
             <a:fld id="{65F7C1B1-FAD3-1847-BAA2-20EE38C9D46F}" type="datetimeFigureOut">
               <a:rPr lang="en-US" smtClean="0"/>
-              <a:t>12/14/25</a:t>
+              <a:t>12/15/25</a:t>
             </a:fld>
             <a:endParaRPr lang="en-US"/>
           </a:p>
@@ -1949,7 +2046,7 @@
           <a:p>
             <a:fld id="{65F7C1B1-FAD3-1847-BAA2-20EE38C9D46F}" type="datetimeFigureOut">
               <a:rPr lang="en-US" smtClean="0"/>
-              <a:t>12/14/25</a:t>
+              <a:t>12/15/25</a:t>
             </a:fld>
             <a:endParaRPr lang="en-US"/>
           </a:p>
@@ -2365,7 +2462,7 @@
           <a:p>
             <a:fld id="{65F7C1B1-FAD3-1847-BAA2-20EE38C9D46F}" type="datetimeFigureOut">
               <a:rPr lang="en-US" smtClean="0"/>
-              <a:t>12/14/25</a:t>
+              <a:t>12/15/25</a:t>
             </a:fld>
             <a:endParaRPr lang="en-US"/>
           </a:p>
@@ -2514,7 +2611,7 @@
           <a:p>
             <a:fld id="{65F7C1B1-FAD3-1847-BAA2-20EE38C9D46F}" type="datetimeFigureOut">
               <a:rPr lang="en-US" smtClean="0"/>
-              <a:t>12/14/25</a:t>
+              <a:t>12/15/25</a:t>
             </a:fld>
             <a:endParaRPr lang="en-US"/>
           </a:p>
@@ -2640,7 +2737,7 @@
           <a:p>
             <a:fld id="{65F7C1B1-FAD3-1847-BAA2-20EE38C9D46F}" type="datetimeFigureOut">
               <a:rPr lang="en-US" smtClean="0"/>
-              <a:t>12/14/25</a:t>
+              <a:t>12/15/25</a:t>
             </a:fld>
             <a:endParaRPr lang="en-US"/>
           </a:p>
@@ -2891,7 +2988,7 @@
           <a:p>
             <a:fld id="{65F7C1B1-FAD3-1847-BAA2-20EE38C9D46F}" type="datetimeFigureOut">
               <a:rPr lang="en-US" smtClean="0"/>
-              <a:t>12/14/25</a:t>
+              <a:t>12/15/25</a:t>
             </a:fld>
             <a:endParaRPr lang="en-US"/>
           </a:p>
@@ -3336,7 +3433,7 @@
           <a:p>
             <a:fld id="{65F7C1B1-FAD3-1847-BAA2-20EE38C9D46F}" type="datetimeFigureOut">
               <a:rPr lang="en-US" smtClean="0"/>
-              <a:t>12/14/25</a:t>
+              <a:t>12/15/25</a:t>
             </a:fld>
             <a:endParaRPr lang="en-US"/>
           </a:p>
@@ -3503,6 +3600,13 @@
             <a:schemeClr val="lt1"/>
           </a:fontRef>
         </p:style>
+        <p:txBody>
+          <a:bodyPr/>
+          <a:lstStyle/>
+          <a:p>
+            <a:endParaRPr lang="en-US"/>
+          </a:p>
+        </p:txBody>
       </p:sp>
       <p:pic>
         <p:nvPicPr>
@@ -3663,7 +3767,7 @@
           <a:p>
             <a:fld id="{65F7C1B1-FAD3-1847-BAA2-20EE38C9D46F}" type="datetimeFigureOut">
               <a:rPr lang="en-US" smtClean="0"/>
-              <a:t>12/14/25</a:t>
+              <a:t>12/15/25</a:t>
             </a:fld>
             <a:endParaRPr lang="en-US"/>
           </a:p>
@@ -4218,7 +4322,7 @@
             </a:r>
             <a:r>
               <a:rPr lang="en-US" dirty="0"/>
-              <a:t>Does Distracted driving significantly increase the likelihood of a drive being found  “At Fault” and lead to more severe vehicle damage?</a:t>
+              <a:t>Does Distracted driving significantly increase the likelihood of a driver being found  “At Fault” and lead to more severe vehicle damage?</a:t>
             </a:r>
           </a:p>
           <a:p>
@@ -4469,8 +4573,8 @@
         </p:nvSpPr>
         <p:spPr bwMode="auto">
           <a:xfrm>
-            <a:off x="1451579" y="2633042"/>
-            <a:ext cx="10622331" cy="2215991"/>
+            <a:off x="1345254" y="2351288"/>
+            <a:ext cx="10680424" cy="2800767"/>
           </a:xfrm>
           <a:prstGeom prst="rect">
             <a:avLst/>
@@ -4518,7 +4622,7 @@
           </a:bodyPr>
           <a:lstStyle/>
           <a:p>
-            <a:pPr marL="0" marR="0" lvl="0" indent="0" algn="l" defTabSz="914400" rtl="0" eaLnBrk="0" fontAlgn="base" latinLnBrk="0" hangingPunct="0">
+            <a:pPr marL="0" marR="0" lvl="0" indent="0" defTabSz="914400" rtl="0" eaLnBrk="0" fontAlgn="base" latinLnBrk="0" hangingPunct="0">
               <a:lnSpc>
                 <a:spcPct val="100000"/>
               </a:lnSpc>
@@ -4562,7 +4666,7 @@
             </a:r>
           </a:p>
           <a:p>
-            <a:pPr marL="0" marR="0" lvl="0" indent="0" algn="l" defTabSz="914400" rtl="0" eaLnBrk="0" fontAlgn="base" latinLnBrk="0" hangingPunct="0">
+            <a:pPr marL="0" marR="0" lvl="0" indent="0" defTabSz="914400" rtl="0" eaLnBrk="0" fontAlgn="base" latinLnBrk="0" hangingPunct="0">
               <a:lnSpc>
                 <a:spcPct val="100000"/>
               </a:lnSpc>
@@ -4685,7 +4789,7 @@
             </a:r>
           </a:p>
           <a:p>
-            <a:pPr marL="0" marR="0" lvl="0" indent="0" algn="l" defTabSz="914400" rtl="0" eaLnBrk="0" fontAlgn="base" latinLnBrk="0" hangingPunct="0">
+            <a:pPr marL="0" marR="0" lvl="0" indent="0" defTabSz="914400" rtl="0" eaLnBrk="0" fontAlgn="base" latinLnBrk="0" hangingPunct="0">
               <a:lnSpc>
                 <a:spcPct val="100000"/>
               </a:lnSpc>
@@ -4726,7 +4830,7 @@
             </a:endParaRPr>
           </a:p>
           <a:p>
-            <a:pPr marL="457200" lvl="1" indent="0" eaLnBrk="0" fontAlgn="base" hangingPunct="0">
+            <a:pPr lvl="1" eaLnBrk="0" fontAlgn="base" hangingPunct="0">
               <a:lnSpc>
                 <a:spcPct val="100000"/>
               </a:lnSpc>
@@ -4738,8 +4842,6 @@
               </a:spcAft>
               <a:buClrTx/>
               <a:buSzTx/>
-              <a:buFontTx/>
-              <a:buChar char="•"/>
             </a:pPr>
             <a:r>
               <a:rPr kumimoji="0" lang="en-US" altLang="en-US" sz="1600" b="0" i="0" u="none" strike="noStrike" cap="none" normalizeH="0" baseline="0" dirty="0">
@@ -4779,49 +4881,6 @@
                 <a:latin typeface="Arial" panose="020B0604020202020204" pitchFamily="34" charset="0"/>
               </a:rPr>
               <a:t>.</a:t>
-            </a:r>
-          </a:p>
-          <a:p>
-            <a:pPr marL="457200" lvl="1" indent="0" eaLnBrk="0" fontAlgn="base" hangingPunct="0">
-              <a:lnSpc>
-                <a:spcPct val="100000"/>
-              </a:lnSpc>
-              <a:spcBef>
-                <a:spcPct val="0"/>
-              </a:spcBef>
-              <a:spcAft>
-                <a:spcPct val="0"/>
-              </a:spcAft>
-              <a:buClrTx/>
-              <a:buSzTx/>
-              <a:buFontTx/>
-              <a:buChar char="•"/>
-            </a:pPr>
-            <a:r>
-              <a:rPr kumimoji="0" lang="en-US" altLang="en-US" sz="1600" b="1" i="0" u="none" strike="noStrike" cap="none" normalizeH="0" baseline="0" dirty="0">
-                <a:ln>
-                  <a:noFill/>
-                </a:ln>
-                <a:solidFill>
-                  <a:schemeClr val="tx1"/>
-                </a:solidFill>
-                <a:effectLst/>
-                <a:latin typeface="Arial" panose="020B0604020202020204" pitchFamily="34" charset="0"/>
-              </a:rPr>
-              <a:t>Why:</a:t>
-            </a:r>
-            <a:r>
-              <a:rPr kumimoji="0" lang="en-US" altLang="en-US" sz="1600" b="0" i="0" u="none" strike="noStrike" cap="none" normalizeH="0" baseline="0" dirty="0">
-                <a:ln>
-                  <a:noFill/>
-                </a:ln>
-                <a:solidFill>
-                  <a:schemeClr val="tx1"/>
-                </a:solidFill>
-                <a:effectLst/>
-                <a:latin typeface="Arial" panose="020B0604020202020204" pitchFamily="34" charset="0"/>
-              </a:rPr>
-              <a:t> The Central Limit Theorem (CLT) does not apply to medians of discrete, </a:t>
             </a:r>
           </a:p>
           <a:p>
@@ -4839,18 +4898,77 @@
               <a:buSzTx/>
               <a:buNone/>
             </a:pPr>
-            <a:r>
-              <a:rPr kumimoji="0" lang="en-US" altLang="en-US" sz="1600" b="0" i="0" u="none" strike="noStrike" cap="none" normalizeH="0" baseline="0" dirty="0">
-                <a:ln>
-                  <a:noFill/>
-                </a:ln>
-                <a:solidFill>
-                  <a:schemeClr val="tx1"/>
-                </a:solidFill>
-                <a:effectLst/>
-                <a:latin typeface="Arial" panose="020B0604020202020204" pitchFamily="34" charset="0"/>
-              </a:rPr>
-              <a:t>ordinal data (0-4 scale), so standard z-tests or t-tests would be invalid </a:t>
+            <a:endParaRPr lang="en-US" b="1" dirty="0"/>
+          </a:p>
+          <a:p>
+            <a:pPr marL="457200" lvl="1" indent="0" eaLnBrk="0" fontAlgn="base" hangingPunct="0">
+              <a:lnSpc>
+                <a:spcPct val="100000"/>
+              </a:lnSpc>
+              <a:spcBef>
+                <a:spcPct val="0"/>
+              </a:spcBef>
+              <a:spcAft>
+                <a:spcPct val="0"/>
+              </a:spcAft>
+              <a:buClrTx/>
+              <a:buSzTx/>
+              <a:buNone/>
+            </a:pPr>
+            <a:r>
+              <a:rPr lang="en-US" b="1" dirty="0"/>
+              <a:t>Why CLT does not apply: </a:t>
+            </a:r>
+          </a:p>
+          <a:p>
+            <a:pPr lvl="1" eaLnBrk="0" fontAlgn="base" hangingPunct="0">
+              <a:lnSpc>
+                <a:spcPct val="100000"/>
+              </a:lnSpc>
+              <a:spcBef>
+                <a:spcPct val="0"/>
+              </a:spcBef>
+              <a:spcAft>
+                <a:spcPct val="0"/>
+              </a:spcAft>
+              <a:buClrTx/>
+              <a:buSzTx/>
+            </a:pPr>
+            <a:r>
+              <a:rPr lang="en-US" dirty="0"/>
+              <a:t>	The damage score is discrete and ordinal (integers 0-4) and the sampling distribution of a median</a:t>
+            </a:r>
+          </a:p>
+          <a:p>
+            <a:pPr marL="457200" lvl="1" indent="0" eaLnBrk="0" fontAlgn="base" hangingPunct="0">
+              <a:lnSpc>
+                <a:spcPct val="100000"/>
+              </a:lnSpc>
+              <a:spcBef>
+                <a:spcPct val="0"/>
+              </a:spcBef>
+              <a:spcAft>
+                <a:spcPct val="0"/>
+              </a:spcAft>
+              <a:buClrTx/>
+              <a:buSzTx/>
+              <a:buNone/>
+            </a:pPr>
+            <a:r>
+              <a:rPr lang="en-US"/>
+              <a:t>from </a:t>
+            </a:r>
+            <a:r>
+              <a:rPr lang="en-US" dirty="0"/>
+              <a:t>such a distribution is generally not normal</a:t>
+            </a:r>
+            <a:r>
+              <a:rPr lang="en-US"/>
+              <a:t>, making </a:t>
+            </a:r>
+            <a:r>
+              <a:rPr lang="en-US" dirty="0"/>
+              <a:t>standard parametric confidence intervals invalid.</a:t>
             </a:r>
           </a:p>
           <a:p>

</xml_diff>